<commit_message>
added my cleanup section notes, added a sources backup slide
</commit_message>
<xml_diff>
--- a/Spring Chinook Salmon in the Portland Metro Area.pptx
+++ b/Spring Chinook Salmon in the Portland Metro Area.pptx
@@ -5,7 +5,7 @@
     <p:sldMasterId id="2147483840" r:id="rId1"/>
   </p:sldMasterIdLst>
   <p:notesMasterIdLst>
-    <p:notesMasterId r:id="rId11"/>
+    <p:notesMasterId r:id="rId13"/>
   </p:notesMasterIdLst>
   <p:sldIdLst>
     <p:sldId id="256" r:id="rId2"/>
@@ -17,6 +17,8 @@
     <p:sldId id="263" r:id="rId8"/>
     <p:sldId id="265" r:id="rId9"/>
     <p:sldId id="264" r:id="rId10"/>
+    <p:sldId id="266" r:id="rId11"/>
+    <p:sldId id="267" r:id="rId12"/>
   </p:sldIdLst>
   <p:sldSz cx="12192000" cy="6858000"/>
   <p:notesSz cx="6858000" cy="9144000"/>
@@ -329,7 +331,7 @@
           <a:p>
             <a:fld id="{58952F50-9AC3-48F1-A657-DC6C258797CF}" type="datetimeFigureOut">
               <a:rPr lang="en-US" smtClean="0"/>
-              <a:t>11/8/2020</a:t>
+              <a:t>11/9/2020</a:t>
             </a:fld>
             <a:endParaRPr lang="en-US"/>
           </a:p>
@@ -744,7 +746,7 @@
           <a:p>
             <a:r>
               <a:rPr lang="en-US" sz="1000" dirty="0"/>
-              <a:t>There are over 450 dames throughout the entire Columbia River system</a:t>
+              <a:t>There are over 450 dams throughout the entire Columbia River system</a:t>
             </a:r>
           </a:p>
           <a:p>
@@ -1219,49 +1221,160 @@
           <a:p>
             <a:r>
               <a:rPr lang="en-US" dirty="0"/>
-              <a:t>Salmon Count (Jenny)</a:t>
+              <a:t>The nature of the data on the web is there can be several false positives when searching through all the </a:t>
             </a:r>
           </a:p>
           <a:p>
             <a:r>
               <a:rPr lang="en-US" dirty="0"/>
-              <a:t>Bonneville Above Dam (Courtney/Jenny)</a:t>
+              <a:t>different keywords.   </a:t>
             </a:r>
           </a:p>
           <a:p>
             <a:r>
               <a:rPr lang="en-US" dirty="0"/>
-              <a:t>-Temperature and Gage Height</a:t>
-            </a:r>
-          </a:p>
-          <a:p>
+              <a:t>   - Many sites had great </a:t>
+            </a:r>
+            <a:r>
+              <a:rPr lang="en-US" dirty="0" err="1"/>
+              <a:t>narritives</a:t>
+            </a:r>
             <a:r>
               <a:rPr lang="en-US" dirty="0"/>
-              <a:t>Bonneville Below Dam (Jay)</a:t>
-            </a:r>
+              <a:t> but cited data wasn't consumable in the form we needed </a:t>
+            </a:r>
+          </a:p>
+          <a:p>
+            <a:endParaRPr lang="en-US" dirty="0"/>
           </a:p>
           <a:p>
             <a:r>
               <a:rPr lang="en-US" dirty="0"/>
-              <a:t>-Temperature and Gage Height</a:t>
+              <a:t>It was important to us that we could find consistent and reliable data sources. </a:t>
             </a:r>
           </a:p>
           <a:p>
             <a:r>
               <a:rPr lang="en-US" dirty="0"/>
-              <a:t>Willamette Falls (Josh)</a:t>
-            </a:r>
+              <a:t>   - We found many partial sources (like a dam was removed which lead to a partial dataset)</a:t>
+            </a:r>
+          </a:p>
+          <a:p>
+            <a:endParaRPr lang="en-US" dirty="0"/>
           </a:p>
           <a:p>
             <a:r>
               <a:rPr lang="en-US" dirty="0"/>
-              <a:t>-Temperature and Gage Height</a:t>
+              <a:t>There were many sites where data mining would have been cumbersome because of the underlying format </a:t>
             </a:r>
           </a:p>
           <a:p>
             <a:r>
               <a:rPr lang="en-US" dirty="0"/>
-              <a:t>Portland Metro Population (Erica)</a:t>
+              <a:t>(embedded in research papers or some static visualizations).  </a:t>
+            </a:r>
+          </a:p>
+          <a:p>
+            <a:r>
+              <a:rPr lang="en-US" dirty="0"/>
+              <a:t>   - Example Commercial Fishing site, which we decided against</a:t>
+            </a:r>
+          </a:p>
+          <a:p>
+            <a:endParaRPr lang="en-US" dirty="0"/>
+          </a:p>
+          <a:p>
+            <a:r>
+              <a:rPr lang="en-US" dirty="0"/>
+              <a:t>Once we did find data that was easily </a:t>
+            </a:r>
+            <a:r>
+              <a:rPr lang="en-US" dirty="0" err="1"/>
+              <a:t>queryable</a:t>
+            </a:r>
+            <a:r>
+              <a:rPr lang="en-US" dirty="0"/>
+              <a:t> through the user interface working through the </a:t>
+            </a:r>
+          </a:p>
+          <a:p>
+            <a:r>
+              <a:rPr lang="en-US" dirty="0"/>
+              <a:t>shape and grain of data we wanted to select wasn’t made any easier by the 1990’s type web interfaces.  </a:t>
+            </a:r>
+          </a:p>
+          <a:p>
+            <a:r>
+              <a:rPr lang="en-US" dirty="0"/>
+              <a:t>    - Also in the data we found no reliable APIs were found, so we were stuck with CSVs</a:t>
+            </a:r>
+          </a:p>
+          <a:p>
+            <a:endParaRPr lang="en-US" dirty="0"/>
+          </a:p>
+          <a:p>
+            <a:r>
+              <a:rPr lang="en-US" dirty="0"/>
+              <a:t>Then there was the problem who pulled what and what to decide was relevant and not relevant data sources </a:t>
+            </a:r>
+          </a:p>
+          <a:p>
+            <a:r>
+              <a:rPr lang="en-US" dirty="0"/>
+              <a:t>(was the source of the data close enough to the locations we were interested in). </a:t>
+            </a:r>
+          </a:p>
+          <a:p>
+            <a:r>
+              <a:rPr lang="en-US" dirty="0"/>
+              <a:t>    - Josh and I on more than one </a:t>
+            </a:r>
+            <a:r>
+              <a:rPr lang="en-US" dirty="0" err="1"/>
+              <a:t>occassion</a:t>
+            </a:r>
+            <a:r>
+              <a:rPr lang="en-US" dirty="0"/>
+              <a:t> pull data from the wrong location and or for the wrong time period</a:t>
+            </a:r>
+          </a:p>
+          <a:p>
+            <a:endParaRPr lang="en-US" dirty="0"/>
+          </a:p>
+          <a:p>
+            <a:r>
+              <a:rPr lang="en-US" dirty="0"/>
+              <a:t>Lastly, there were plenty of troubles with the data with regards to format and having consistent data points,  </a:t>
+            </a:r>
+          </a:p>
+          <a:p>
+            <a:r>
+              <a:rPr lang="en-US" dirty="0"/>
+              <a:t>this did lead us to dropping a few data points along the way.  </a:t>
+            </a:r>
+          </a:p>
+          <a:p>
+            <a:r>
+              <a:rPr lang="en-US" dirty="0"/>
+              <a:t>    - We were luck in this regard since the number of data points were not significant enough to have any effect on the outcome</a:t>
+            </a:r>
+          </a:p>
+          <a:p>
+            <a:endParaRPr lang="en-US" dirty="0"/>
+          </a:p>
+          <a:p>
+            <a:endParaRPr lang="en-US" dirty="0"/>
+          </a:p>
+          <a:p>
+            <a:r>
+              <a:rPr lang="en-US" dirty="0"/>
+              <a:t>We also needed to be careful since our data way time sensitive in the way salmon migration timings work.</a:t>
+            </a:r>
+          </a:p>
+          <a:p>
+            <a:r>
+              <a:rPr lang="en-US" dirty="0"/>
+              <a:t>    - Since the spring chinook salmon run is from March to April we needed to make sure any data used reflected that time period</a:t>
             </a:r>
           </a:p>
         </p:txBody>
@@ -1283,7 +1396,7 @@
           <a:p>
             <a:fld id="{4DF9C49E-566E-4C32-9550-3CFB77E325AD}" type="slidenum">
               <a:rPr lang="en-US" smtClean="0"/>
-              <a:t>7</a:t>
+              <a:t>6</a:t>
             </a:fld>
             <a:endParaRPr lang="en-US"/>
           </a:p>
@@ -1292,7 +1405,7 @@
     </p:spTree>
     <p:extLst>
       <p:ext uri="{BB962C8B-B14F-4D97-AF65-F5344CB8AC3E}">
-        <p14:creationId xmlns:p14="http://schemas.microsoft.com/office/powerpoint/2010/main" val="680565019"/>
+        <p14:creationId xmlns:p14="http://schemas.microsoft.com/office/powerpoint/2010/main" val="1103883782"/>
       </p:ext>
     </p:extLst>
   </p:cSld>
@@ -1348,6 +1461,135 @@
           <a:p>
             <a:r>
               <a:rPr lang="en-US" dirty="0"/>
+              <a:t>Salmon Count (Jenny)</a:t>
+            </a:r>
+          </a:p>
+          <a:p>
+            <a:r>
+              <a:rPr lang="en-US" dirty="0"/>
+              <a:t>Bonneville Above Dam (Courtney/Jenny)</a:t>
+            </a:r>
+          </a:p>
+          <a:p>
+            <a:r>
+              <a:rPr lang="en-US" dirty="0"/>
+              <a:t>-Temperature and Gage Height</a:t>
+            </a:r>
+          </a:p>
+          <a:p>
+            <a:r>
+              <a:rPr lang="en-US" dirty="0"/>
+              <a:t>Bonneville Below Dam (Jay)</a:t>
+            </a:r>
+          </a:p>
+          <a:p>
+            <a:r>
+              <a:rPr lang="en-US" dirty="0"/>
+              <a:t>-Temperature and Gage Height</a:t>
+            </a:r>
+          </a:p>
+          <a:p>
+            <a:r>
+              <a:rPr lang="en-US" dirty="0"/>
+              <a:t>Willamette Falls (Josh)</a:t>
+            </a:r>
+          </a:p>
+          <a:p>
+            <a:r>
+              <a:rPr lang="en-US" dirty="0"/>
+              <a:t>-Temperature and Gage Height</a:t>
+            </a:r>
+          </a:p>
+          <a:p>
+            <a:r>
+              <a:rPr lang="en-US" dirty="0"/>
+              <a:t>Portland Metro Population (Erica)</a:t>
+            </a:r>
+          </a:p>
+        </p:txBody>
+      </p:sp>
+      <p:sp>
+        <p:nvSpPr>
+          <p:cNvPr id="4" name="Slide Number Placeholder 3"/>
+          <p:cNvSpPr>
+            <a:spLocks noGrp="1"/>
+          </p:cNvSpPr>
+          <p:nvPr>
+            <p:ph type="sldNum" sz="quarter" idx="5"/>
+          </p:nvPr>
+        </p:nvSpPr>
+        <p:spPr/>
+        <p:txBody>
+          <a:bodyPr/>
+          <a:lstStyle/>
+          <a:p>
+            <a:fld id="{4DF9C49E-566E-4C32-9550-3CFB77E325AD}" type="slidenum">
+              <a:rPr lang="en-US" smtClean="0"/>
+              <a:t>7</a:t>
+            </a:fld>
+            <a:endParaRPr lang="en-US"/>
+          </a:p>
+        </p:txBody>
+      </p:sp>
+    </p:spTree>
+    <p:extLst>
+      <p:ext uri="{BB962C8B-B14F-4D97-AF65-F5344CB8AC3E}">
+        <p14:creationId xmlns:p14="http://schemas.microsoft.com/office/powerpoint/2010/main" val="680565019"/>
+      </p:ext>
+    </p:extLst>
+  </p:cSld>
+  <p:clrMapOvr>
+    <a:masterClrMapping/>
+  </p:clrMapOvr>
+</p:notes>
+</file>
+
+<file path=ppt/notesSlides/notesSlide8.xml><?xml version="1.0" encoding="utf-8"?>
+<p:notes xmlns:a="http://schemas.openxmlformats.org/drawingml/2006/main" xmlns:r="http://schemas.openxmlformats.org/officeDocument/2006/relationships" xmlns:p="http://schemas.openxmlformats.org/presentationml/2006/main">
+  <p:cSld>
+    <p:spTree>
+      <p:nvGrpSpPr>
+        <p:cNvPr id="1" name=""/>
+        <p:cNvGrpSpPr/>
+        <p:nvPr/>
+      </p:nvGrpSpPr>
+      <p:grpSpPr>
+        <a:xfrm>
+          <a:off x="0" y="0"/>
+          <a:ext cx="0" cy="0"/>
+          <a:chOff x="0" y="0"/>
+          <a:chExt cx="0" cy="0"/>
+        </a:xfrm>
+      </p:grpSpPr>
+      <p:sp>
+        <p:nvSpPr>
+          <p:cNvPr id="2" name="Slide Image Placeholder 1"/>
+          <p:cNvSpPr>
+            <a:spLocks noGrp="1" noRot="1" noChangeAspect="1"/>
+          </p:cNvSpPr>
+          <p:nvPr>
+            <p:ph type="sldImg"/>
+          </p:nvPr>
+        </p:nvSpPr>
+        <p:spPr/>
+      </p:sp>
+      <p:sp>
+        <p:nvSpPr>
+          <p:cNvPr id="3" name="Notes Placeholder 2"/>
+          <p:cNvSpPr>
+            <a:spLocks noGrp="1"/>
+          </p:cNvSpPr>
+          <p:nvPr>
+            <p:ph type="body" idx="1"/>
+          </p:nvPr>
+        </p:nvSpPr>
+        <p:spPr/>
+        <p:txBody>
+          <a:bodyPr/>
+          <a:lstStyle/>
+          <a:p>
+            <a:r>
+              <a:rPr lang="en-US" dirty="0"/>
               <a:t>In all, we would have liked to have more time to research available data for plausible causes to the chinook salmon decline.</a:t>
             </a:r>
           </a:p>
@@ -1389,6 +1631,90 @@
     <p:extLst>
       <p:ext uri="{BB962C8B-B14F-4D97-AF65-F5344CB8AC3E}">
         <p14:creationId xmlns:p14="http://schemas.microsoft.com/office/powerpoint/2010/main" val="982507536"/>
+      </p:ext>
+    </p:extLst>
+  </p:cSld>
+  <p:clrMapOvr>
+    <a:masterClrMapping/>
+  </p:clrMapOvr>
+</p:notes>
+</file>
+
+<file path=ppt/notesSlides/notesSlide9.xml><?xml version="1.0" encoding="utf-8"?>
+<p:notes xmlns:a="http://schemas.openxmlformats.org/drawingml/2006/main" xmlns:r="http://schemas.openxmlformats.org/officeDocument/2006/relationships" xmlns:p="http://schemas.openxmlformats.org/presentationml/2006/main">
+  <p:cSld>
+    <p:spTree>
+      <p:nvGrpSpPr>
+        <p:cNvPr id="1" name=""/>
+        <p:cNvGrpSpPr/>
+        <p:nvPr/>
+      </p:nvGrpSpPr>
+      <p:grpSpPr>
+        <a:xfrm>
+          <a:off x="0" y="0"/>
+          <a:ext cx="0" cy="0"/>
+          <a:chOff x="0" y="0"/>
+          <a:chExt cx="0" cy="0"/>
+        </a:xfrm>
+      </p:grpSpPr>
+      <p:sp>
+        <p:nvSpPr>
+          <p:cNvPr id="2" name="Slide Image Placeholder 1"/>
+          <p:cNvSpPr>
+            <a:spLocks noGrp="1" noRot="1" noChangeAspect="1"/>
+          </p:cNvSpPr>
+          <p:nvPr>
+            <p:ph type="sldImg"/>
+          </p:nvPr>
+        </p:nvSpPr>
+        <p:spPr/>
+      </p:sp>
+      <p:sp>
+        <p:nvSpPr>
+          <p:cNvPr id="3" name="Notes Placeholder 2"/>
+          <p:cNvSpPr>
+            <a:spLocks noGrp="1"/>
+          </p:cNvSpPr>
+          <p:nvPr>
+            <p:ph type="body" idx="1"/>
+          </p:nvPr>
+        </p:nvSpPr>
+        <p:spPr/>
+        <p:txBody>
+          <a:bodyPr/>
+          <a:lstStyle/>
+          <a:p>
+            <a:endParaRPr lang="en-US"/>
+          </a:p>
+        </p:txBody>
+      </p:sp>
+      <p:sp>
+        <p:nvSpPr>
+          <p:cNvPr id="4" name="Slide Number Placeholder 3"/>
+          <p:cNvSpPr>
+            <a:spLocks noGrp="1"/>
+          </p:cNvSpPr>
+          <p:nvPr>
+            <p:ph type="sldNum" sz="quarter" idx="5"/>
+          </p:nvPr>
+        </p:nvSpPr>
+        <p:spPr/>
+        <p:txBody>
+          <a:bodyPr/>
+          <a:lstStyle/>
+          <a:p>
+            <a:fld id="{4DF9C49E-566E-4C32-9550-3CFB77E325AD}" type="slidenum">
+              <a:rPr lang="en-US" smtClean="0"/>
+              <a:t>11</a:t>
+            </a:fld>
+            <a:endParaRPr lang="en-US"/>
+          </a:p>
+        </p:txBody>
+      </p:sp>
+    </p:spTree>
+    <p:extLst>
+      <p:ext uri="{BB962C8B-B14F-4D97-AF65-F5344CB8AC3E}">
+        <p14:creationId xmlns:p14="http://schemas.microsoft.com/office/powerpoint/2010/main" val="2152460452"/>
       </p:ext>
     </p:extLst>
   </p:cSld>
@@ -1623,7 +1949,7 @@
             <a:fld id="{5586B75A-687E-405C-8A0B-8D00578BA2C3}" type="datetimeFigureOut">
               <a:rPr lang="en-US" dirty="0"/>
               <a:pPr/>
-              <a:t>11/8/2020</a:t>
+              <a:t>11/9/2020</a:t>
             </a:fld>
             <a:endParaRPr lang="en-US" dirty="0"/>
           </a:p>
@@ -1790,7 +2116,7 @@
             <a:fld id="{5586B75A-687E-405C-8A0B-8D00578BA2C3}" type="datetimeFigureOut">
               <a:rPr lang="en-US" dirty="0"/>
               <a:pPr/>
-              <a:t>11/8/2020</a:t>
+              <a:t>11/9/2020</a:t>
             </a:fld>
             <a:endParaRPr lang="en-US" dirty="0"/>
           </a:p>
@@ -1967,7 +2293,7 @@
             <a:fld id="{5586B75A-687E-405C-8A0B-8D00578BA2C3}" type="datetimeFigureOut">
               <a:rPr lang="en-US" dirty="0"/>
               <a:pPr/>
-              <a:t>11/8/2020</a:t>
+              <a:t>11/9/2020</a:t>
             </a:fld>
             <a:endParaRPr lang="en-US" dirty="0"/>
           </a:p>
@@ -2134,7 +2460,7 @@
             <a:fld id="{5586B75A-687E-405C-8A0B-8D00578BA2C3}" type="datetimeFigureOut">
               <a:rPr lang="en-US" dirty="0"/>
               <a:pPr/>
-              <a:t>11/8/2020</a:t>
+              <a:t>11/9/2020</a:t>
             </a:fld>
             <a:endParaRPr lang="en-US" dirty="0"/>
           </a:p>
@@ -2385,7 +2711,7 @@
             <a:fld id="{5586B75A-687E-405C-8A0B-8D00578BA2C3}" type="datetimeFigureOut">
               <a:rPr lang="en-US" dirty="0"/>
               <a:pPr/>
-              <a:t>11/8/2020</a:t>
+              <a:t>11/9/2020</a:t>
             </a:fld>
             <a:endParaRPr lang="en-US" dirty="0"/>
           </a:p>
@@ -2670,7 +2996,7 @@
             <a:fld id="{5586B75A-687E-405C-8A0B-8D00578BA2C3}" type="datetimeFigureOut">
               <a:rPr lang="en-US" dirty="0"/>
               <a:pPr/>
-              <a:t>11/8/2020</a:t>
+              <a:t>11/9/2020</a:t>
             </a:fld>
             <a:endParaRPr lang="en-US" dirty="0"/>
           </a:p>
@@ -3109,7 +3435,7 @@
             <a:fld id="{5586B75A-687E-405C-8A0B-8D00578BA2C3}" type="datetimeFigureOut">
               <a:rPr lang="en-US" dirty="0"/>
               <a:pPr/>
-              <a:t>11/8/2020</a:t>
+              <a:t>11/9/2020</a:t>
             </a:fld>
             <a:endParaRPr lang="en-US" dirty="0"/>
           </a:p>
@@ -3224,7 +3550,7 @@
             <a:fld id="{5586B75A-687E-405C-8A0B-8D00578BA2C3}" type="datetimeFigureOut">
               <a:rPr lang="en-US" dirty="0"/>
               <a:pPr/>
-              <a:t>11/8/2020</a:t>
+              <a:t>11/9/2020</a:t>
             </a:fld>
             <a:endParaRPr lang="en-US" dirty="0"/>
           </a:p>
@@ -3316,7 +3642,7 @@
             <a:fld id="{5586B75A-687E-405C-8A0B-8D00578BA2C3}" type="datetimeFigureOut">
               <a:rPr lang="en-US" dirty="0"/>
               <a:pPr/>
-              <a:t>11/8/2020</a:t>
+              <a:t>11/9/2020</a:t>
             </a:fld>
             <a:endParaRPr lang="en-US" dirty="0"/>
           </a:p>
@@ -3601,7 +3927,7 @@
             <a:fld id="{5586B75A-687E-405C-8A0B-8D00578BA2C3}" type="datetimeFigureOut">
               <a:rPr lang="en-US" dirty="0"/>
               <a:pPr/>
-              <a:t>11/8/2020</a:t>
+              <a:t>11/9/2020</a:t>
             </a:fld>
             <a:endParaRPr lang="en-US" dirty="0"/>
           </a:p>
@@ -3871,7 +4197,7 @@
             <a:fld id="{5586B75A-687E-405C-8A0B-8D00578BA2C3}" type="datetimeFigureOut">
               <a:rPr lang="en-US" dirty="0"/>
               <a:pPr/>
-              <a:t>11/8/2020</a:t>
+              <a:t>11/9/2020</a:t>
             </a:fld>
             <a:endParaRPr lang="en-US" dirty="0"/>
           </a:p>
@@ -4165,7 +4491,7 @@
             <a:fld id="{5586B75A-687E-405C-8A0B-8D00578BA2C3}" type="datetimeFigureOut">
               <a:rPr lang="en-US" dirty="0"/>
               <a:pPr/>
-              <a:t>11/8/2020</a:t>
+              <a:t>11/9/2020</a:t>
             </a:fld>
             <a:endParaRPr lang="en-US" dirty="0"/>
           </a:p>
@@ -4713,6 +5039,737 @@
 </p:sld>
 </file>
 
+<file path=ppt/slides/slide10.xml><?xml version="1.0" encoding="utf-8"?>
+<p:sld xmlns:a="http://schemas.openxmlformats.org/drawingml/2006/main" xmlns:r="http://schemas.openxmlformats.org/officeDocument/2006/relationships" xmlns:p="http://schemas.openxmlformats.org/presentationml/2006/main">
+  <p:cSld>
+    <p:bg>
+      <p:bgPr>
+        <a:solidFill>
+          <a:schemeClr val="bg1"/>
+        </a:solidFill>
+        <a:effectLst/>
+      </p:bgPr>
+    </p:bg>
+    <p:spTree>
+      <p:nvGrpSpPr>
+        <p:cNvPr id="1" name=""/>
+        <p:cNvGrpSpPr/>
+        <p:nvPr/>
+      </p:nvGrpSpPr>
+      <p:grpSpPr>
+        <a:xfrm>
+          <a:off x="0" y="0"/>
+          <a:ext cx="0" cy="0"/>
+          <a:chOff x="0" y="0"/>
+          <a:chExt cx="0" cy="0"/>
+        </a:xfrm>
+      </p:grpSpPr>
+      <p:sp>
+        <p:nvSpPr>
+          <p:cNvPr id="21" name="Rectangle 20">
+            <a:extLst>
+              <a:ext uri="{FF2B5EF4-FFF2-40B4-BE49-F238E27FC236}">
+                <a16:creationId xmlns:a16="http://schemas.microsoft.com/office/drawing/2014/main" id="{46D56025-432C-47A6-AE3E-5E57DF3E0B0B}"/>
+              </a:ext>
+              <a:ext uri="{C183D7F6-B498-43B3-948B-1728B52AA6E4}">
+                <adec:decorative xmlns:adec="http://schemas.microsoft.com/office/drawing/2017/decorative" val="1"/>
+              </a:ext>
+            </a:extLst>
+          </p:cNvPr>
+          <p:cNvSpPr>
+            <a:spLocks noGrp="1" noRot="1" noChangeAspect="1" noMove="1" noResize="1" noEditPoints="1" noAdjustHandles="1" noChangeArrowheads="1" noChangeShapeType="1" noTextEdit="1"/>
+          </p:cNvSpPr>
+          <p:nvPr>
+            <p:extLst>
+              <p:ext uri="{386F3935-93C4-4BCD-93E2-E3B085C9AB24}">
+                <p16:designElem xmlns:p16="http://schemas.microsoft.com/office/powerpoint/2015/main" val="1"/>
+              </p:ext>
+            </p:extLst>
+          </p:nvPr>
+        </p:nvSpPr>
+        <p:spPr>
+          <a:xfrm>
+            <a:off x="0" y="761999"/>
+            <a:ext cx="9141619" cy="5334001"/>
+          </a:xfrm>
+          <a:prstGeom prst="rect">
+            <a:avLst/>
+          </a:prstGeom>
+          <a:solidFill>
+            <a:schemeClr val="accent1"/>
+          </a:solidFill>
+          <a:ln>
+            <a:noFill/>
+          </a:ln>
+        </p:spPr>
+        <p:style>
+          <a:lnRef idx="2">
+            <a:schemeClr val="accent1">
+              <a:shade val="50000"/>
+            </a:schemeClr>
+          </a:lnRef>
+          <a:fillRef idx="1">
+            <a:schemeClr val="accent1"/>
+          </a:fillRef>
+          <a:effectRef idx="0">
+            <a:schemeClr val="accent1"/>
+          </a:effectRef>
+          <a:fontRef idx="minor">
+            <a:schemeClr val="lt1"/>
+          </a:fontRef>
+        </p:style>
+      </p:sp>
+      <p:sp>
+        <p:nvSpPr>
+          <p:cNvPr id="23" name="Rectangle 22">
+            <a:extLst>
+              <a:ext uri="{FF2B5EF4-FFF2-40B4-BE49-F238E27FC236}">
+                <a16:creationId xmlns:a16="http://schemas.microsoft.com/office/drawing/2014/main" id="{72D1A8B8-7523-49FA-B7DD-AE0B2271C7F9}"/>
+              </a:ext>
+              <a:ext uri="{C183D7F6-B498-43B3-948B-1728B52AA6E4}">
+                <adec:decorative xmlns:adec="http://schemas.microsoft.com/office/drawing/2017/decorative" val="1"/>
+              </a:ext>
+            </a:extLst>
+          </p:cNvPr>
+          <p:cNvSpPr>
+            <a:spLocks noGrp="1" noRot="1" noChangeAspect="1" noMove="1" noResize="1" noEditPoints="1" noAdjustHandles="1" noChangeArrowheads="1" noChangeShapeType="1" noTextEdit="1"/>
+          </p:cNvSpPr>
+          <p:nvPr>
+            <p:extLst>
+              <p:ext uri="{386F3935-93C4-4BCD-93E2-E3B085C9AB24}">
+                <p16:designElem xmlns:p16="http://schemas.microsoft.com/office/powerpoint/2015/main" val="1"/>
+              </p:ext>
+            </p:extLst>
+          </p:nvPr>
+        </p:nvSpPr>
+        <p:spPr>
+          <a:xfrm>
+            <a:off x="9270263" y="761999"/>
+            <a:ext cx="2925318" cy="5334001"/>
+          </a:xfrm>
+          <a:prstGeom prst="rect">
+            <a:avLst/>
+          </a:prstGeom>
+          <a:solidFill>
+            <a:srgbClr val="C8C8C8">
+              <a:alpha val="50000"/>
+            </a:srgbClr>
+          </a:solidFill>
+          <a:ln>
+            <a:noFill/>
+          </a:ln>
+        </p:spPr>
+        <p:style>
+          <a:lnRef idx="2">
+            <a:schemeClr val="accent1">
+              <a:shade val="50000"/>
+            </a:schemeClr>
+          </a:lnRef>
+          <a:fillRef idx="1">
+            <a:schemeClr val="accent1"/>
+          </a:fillRef>
+          <a:effectRef idx="0">
+            <a:schemeClr val="accent1"/>
+          </a:effectRef>
+          <a:fontRef idx="minor">
+            <a:schemeClr val="lt1"/>
+          </a:fontRef>
+        </p:style>
+      </p:sp>
+      <p:sp useBgFill="1">
+        <p:nvSpPr>
+          <p:cNvPr id="25" name="Rectangle 24">
+            <a:extLst>
+              <a:ext uri="{FF2B5EF4-FFF2-40B4-BE49-F238E27FC236}">
+                <a16:creationId xmlns:a16="http://schemas.microsoft.com/office/drawing/2014/main" id="{6A0CEB20-2839-496C-922D-A386524F398B}"/>
+              </a:ext>
+              <a:ext uri="{C183D7F6-B498-43B3-948B-1728B52AA6E4}">
+                <adec:decorative xmlns:adec="http://schemas.microsoft.com/office/drawing/2017/decorative" val="1"/>
+              </a:ext>
+            </a:extLst>
+          </p:cNvPr>
+          <p:cNvSpPr>
+            <a:spLocks noGrp="1" noRot="1" noChangeAspect="1" noMove="1" noResize="1" noEditPoints="1" noAdjustHandles="1" noChangeArrowheads="1" noChangeShapeType="1" noTextEdit="1"/>
+          </p:cNvSpPr>
+          <p:nvPr>
+            <p:extLst>
+              <p:ext uri="{386F3935-93C4-4BCD-93E2-E3B085C9AB24}">
+                <p16:designElem xmlns:p16="http://schemas.microsoft.com/office/powerpoint/2015/main" val="1"/>
+              </p:ext>
+            </p:extLst>
+          </p:nvPr>
+        </p:nvSpPr>
+        <p:spPr>
+          <a:xfrm>
+            <a:off x="0" y="0"/>
+            <a:ext cx="12191999" cy="6858000"/>
+          </a:xfrm>
+          <a:prstGeom prst="rect">
+            <a:avLst/>
+          </a:prstGeom>
+          <a:ln>
+            <a:noFill/>
+          </a:ln>
+        </p:spPr>
+        <p:style>
+          <a:lnRef idx="2">
+            <a:schemeClr val="accent1">
+              <a:shade val="50000"/>
+            </a:schemeClr>
+          </a:lnRef>
+          <a:fillRef idx="1">
+            <a:schemeClr val="accent1"/>
+          </a:fillRef>
+          <a:effectRef idx="0">
+            <a:schemeClr val="accent1"/>
+          </a:effectRef>
+          <a:fontRef idx="minor">
+            <a:schemeClr val="lt1"/>
+          </a:fontRef>
+        </p:style>
+        <p:txBody>
+          <a:bodyPr rtlCol="0" anchor="ctr"/>
+          <a:lstStyle/>
+          <a:p>
+            <a:pPr algn="ctr"/>
+            <a:endParaRPr lang="en-US"/>
+          </a:p>
+        </p:txBody>
+      </p:sp>
+      <p:sp>
+        <p:nvSpPr>
+          <p:cNvPr id="27" name="Rectangle 26">
+            <a:extLst>
+              <a:ext uri="{FF2B5EF4-FFF2-40B4-BE49-F238E27FC236}">
+                <a16:creationId xmlns:a16="http://schemas.microsoft.com/office/drawing/2014/main" id="{4EE33FA5-2378-4F59-8611-CE0F9CA505A9}"/>
+              </a:ext>
+              <a:ext uri="{C183D7F6-B498-43B3-948B-1728B52AA6E4}">
+                <adec:decorative xmlns:adec="http://schemas.microsoft.com/office/drawing/2017/decorative" val="1"/>
+              </a:ext>
+            </a:extLst>
+          </p:cNvPr>
+          <p:cNvSpPr>
+            <a:spLocks noGrp="1" noRot="1" noChangeAspect="1" noMove="1" noResize="1" noEditPoints="1" noAdjustHandles="1" noChangeArrowheads="1" noChangeShapeType="1" noTextEdit="1"/>
+          </p:cNvSpPr>
+          <p:nvPr>
+            <p:extLst>
+              <p:ext uri="{386F3935-93C4-4BCD-93E2-E3B085C9AB24}">
+                <p16:designElem xmlns:p16="http://schemas.microsoft.com/office/powerpoint/2015/main" val="1"/>
+              </p:ext>
+            </p:extLst>
+          </p:nvPr>
+        </p:nvSpPr>
+        <p:spPr>
+          <a:xfrm>
+            <a:off x="1" y="761999"/>
+            <a:ext cx="4642228" cy="5334001"/>
+          </a:xfrm>
+          <a:prstGeom prst="rect">
+            <a:avLst/>
+          </a:prstGeom>
+          <a:solidFill>
+            <a:schemeClr val="accent1"/>
+          </a:solidFill>
+          <a:ln>
+            <a:noFill/>
+          </a:ln>
+        </p:spPr>
+        <p:style>
+          <a:lnRef idx="2">
+            <a:schemeClr val="accent1">
+              <a:shade val="50000"/>
+            </a:schemeClr>
+          </a:lnRef>
+          <a:fillRef idx="1">
+            <a:schemeClr val="accent1"/>
+          </a:fillRef>
+          <a:effectRef idx="0">
+            <a:schemeClr val="accent1"/>
+          </a:effectRef>
+          <a:fontRef idx="minor">
+            <a:schemeClr val="lt1"/>
+          </a:fontRef>
+        </p:style>
+      </p:sp>
+      <p:sp>
+        <p:nvSpPr>
+          <p:cNvPr id="2" name="Title 1">
+            <a:extLst>
+              <a:ext uri="{FF2B5EF4-FFF2-40B4-BE49-F238E27FC236}">
+                <a16:creationId xmlns:a16="http://schemas.microsoft.com/office/drawing/2014/main" id="{85B1DE85-D73C-4DAE-96DA-55909B9C6F98}"/>
+              </a:ext>
+            </a:extLst>
+          </p:cNvPr>
+          <p:cNvSpPr>
+            <a:spLocks noGrp="1"/>
+          </p:cNvSpPr>
+          <p:nvPr>
+            <p:ph type="title"/>
+          </p:nvPr>
+        </p:nvSpPr>
+        <p:spPr>
+          <a:xfrm>
+            <a:off x="1069849" y="1298448"/>
+            <a:ext cx="3258688" cy="3255264"/>
+          </a:xfrm>
+        </p:spPr>
+        <p:txBody>
+          <a:bodyPr vert="horz" lIns="91440" tIns="45720" rIns="91440" bIns="45720" rtlCol="0" anchor="b">
+            <a:normAutofit/>
+          </a:bodyPr>
+          <a:lstStyle/>
+          <a:p>
+            <a:r>
+              <a:rPr lang="en-US" sz="5000" spc="-100" dirty="0"/>
+              <a:t>Backup</a:t>
+            </a:r>
+            <a:br>
+              <a:rPr lang="en-US" sz="5000" spc="-100" dirty="0"/>
+            </a:br>
+            <a:r>
+              <a:rPr lang="en-US" sz="5000" spc="-100" dirty="0"/>
+              <a:t>Slides</a:t>
+            </a:r>
+          </a:p>
+        </p:txBody>
+      </p:sp>
+      <p:sp>
+        <p:nvSpPr>
+          <p:cNvPr id="29" name="Rectangle 28">
+            <a:extLst>
+              <a:ext uri="{FF2B5EF4-FFF2-40B4-BE49-F238E27FC236}">
+                <a16:creationId xmlns:a16="http://schemas.microsoft.com/office/drawing/2014/main" id="{1C368AEB-D83A-432D-818C-3575285B69C7}"/>
+              </a:ext>
+              <a:ext uri="{C183D7F6-B498-43B3-948B-1728B52AA6E4}">
+                <adec:decorative xmlns:adec="http://schemas.microsoft.com/office/drawing/2017/decorative" val="1"/>
+              </a:ext>
+            </a:extLst>
+          </p:cNvPr>
+          <p:cNvSpPr>
+            <a:spLocks noGrp="1" noRot="1" noChangeAspect="1" noMove="1" noResize="1" noEditPoints="1" noAdjustHandles="1" noChangeArrowheads="1" noChangeShapeType="1" noTextEdit="1"/>
+          </p:cNvSpPr>
+          <p:nvPr>
+            <p:extLst>
+              <p:ext uri="{386F3935-93C4-4BCD-93E2-E3B085C9AB24}">
+                <p16:designElem xmlns:p16="http://schemas.microsoft.com/office/powerpoint/2015/main" val="1"/>
+              </p:ext>
+            </p:extLst>
+          </p:nvPr>
+        </p:nvSpPr>
+        <p:spPr>
+          <a:xfrm>
+            <a:off x="11815864" y="758952"/>
+            <a:ext cx="384048" cy="5330952"/>
+          </a:xfrm>
+          <a:prstGeom prst="rect">
+            <a:avLst/>
+          </a:prstGeom>
+          <a:solidFill>
+            <a:srgbClr val="C8C8C8">
+              <a:alpha val="49804"/>
+            </a:srgbClr>
+          </a:solidFill>
+          <a:ln>
+            <a:noFill/>
+          </a:ln>
+        </p:spPr>
+        <p:style>
+          <a:lnRef idx="2">
+            <a:schemeClr val="accent1">
+              <a:shade val="50000"/>
+            </a:schemeClr>
+          </a:lnRef>
+          <a:fillRef idx="1">
+            <a:schemeClr val="accent1"/>
+          </a:fillRef>
+          <a:effectRef idx="0">
+            <a:schemeClr val="accent1"/>
+          </a:effectRef>
+          <a:fontRef idx="minor">
+            <a:schemeClr val="lt1"/>
+          </a:fontRef>
+        </p:style>
+      </p:sp>
+      <p:sp>
+        <p:nvSpPr>
+          <p:cNvPr id="4" name="Content Placeholder 3">
+            <a:extLst>
+              <a:ext uri="{FF2B5EF4-FFF2-40B4-BE49-F238E27FC236}">
+                <a16:creationId xmlns:a16="http://schemas.microsoft.com/office/drawing/2014/main" id="{950940AE-E5ED-4616-8324-D960895055F4}"/>
+              </a:ext>
+            </a:extLst>
+          </p:cNvPr>
+          <p:cNvSpPr>
+            <a:spLocks noGrp="1"/>
+          </p:cNvSpPr>
+          <p:nvPr>
+            <p:ph sz="half" idx="2"/>
+          </p:nvPr>
+        </p:nvSpPr>
+        <p:spPr/>
+        <p:txBody>
+          <a:bodyPr/>
+          <a:lstStyle/>
+          <a:p>
+            <a:endParaRPr lang="en-US"/>
+          </a:p>
+        </p:txBody>
+      </p:sp>
+    </p:spTree>
+    <p:extLst>
+      <p:ext uri="{BB962C8B-B14F-4D97-AF65-F5344CB8AC3E}">
+        <p14:creationId xmlns:p14="http://schemas.microsoft.com/office/powerpoint/2010/main" val="176359750"/>
+      </p:ext>
+    </p:extLst>
+  </p:cSld>
+  <p:clrMapOvr>
+    <a:masterClrMapping/>
+  </p:clrMapOvr>
+</p:sld>
+</file>
+
+<file path=ppt/slides/slide11.xml><?xml version="1.0" encoding="utf-8"?>
+<p:sld xmlns:a="http://schemas.openxmlformats.org/drawingml/2006/main" xmlns:r="http://schemas.openxmlformats.org/officeDocument/2006/relationships" xmlns:p="http://schemas.openxmlformats.org/presentationml/2006/main">
+  <p:cSld>
+    <p:spTree>
+      <p:nvGrpSpPr>
+        <p:cNvPr id="1" name=""/>
+        <p:cNvGrpSpPr/>
+        <p:nvPr/>
+      </p:nvGrpSpPr>
+      <p:grpSpPr>
+        <a:xfrm>
+          <a:off x="0" y="0"/>
+          <a:ext cx="0" cy="0"/>
+          <a:chOff x="0" y="0"/>
+          <a:chExt cx="0" cy="0"/>
+        </a:xfrm>
+      </p:grpSpPr>
+      <p:sp>
+        <p:nvSpPr>
+          <p:cNvPr id="2" name="Title 1">
+            <a:extLst>
+              <a:ext uri="{FF2B5EF4-FFF2-40B4-BE49-F238E27FC236}">
+                <a16:creationId xmlns:a16="http://schemas.microsoft.com/office/drawing/2014/main" id="{85B1DE85-D73C-4DAE-96DA-55909B9C6F98}"/>
+              </a:ext>
+            </a:extLst>
+          </p:cNvPr>
+          <p:cNvSpPr>
+            <a:spLocks noGrp="1"/>
+          </p:cNvSpPr>
+          <p:nvPr>
+            <p:ph type="title"/>
+          </p:nvPr>
+        </p:nvSpPr>
+        <p:spPr>
+          <a:xfrm>
+            <a:off x="203200" y="1281514"/>
+            <a:ext cx="2980267" cy="3255264"/>
+          </a:xfrm>
+        </p:spPr>
+        <p:txBody>
+          <a:bodyPr vert="horz" lIns="91440" tIns="45720" rIns="91440" bIns="45720" rtlCol="0" anchor="b">
+            <a:normAutofit/>
+          </a:bodyPr>
+          <a:lstStyle/>
+          <a:p>
+            <a:r>
+              <a:rPr lang="en-US" sz="5000" spc="-100" dirty="0"/>
+              <a:t>Data </a:t>
+            </a:r>
+            <a:br>
+              <a:rPr lang="en-US" sz="5000" spc="-100" dirty="0"/>
+            </a:br>
+            <a:r>
+              <a:rPr lang="en-US" sz="5000" spc="-100" dirty="0"/>
+              <a:t>Sources</a:t>
+            </a:r>
+          </a:p>
+        </p:txBody>
+      </p:sp>
+      <p:sp>
+        <p:nvSpPr>
+          <p:cNvPr id="10" name="TextBox 9">
+            <a:extLst>
+              <a:ext uri="{FF2B5EF4-FFF2-40B4-BE49-F238E27FC236}">
+                <a16:creationId xmlns:a16="http://schemas.microsoft.com/office/drawing/2014/main" id="{6C31EDFF-1188-428C-B052-DE8AA11A6709}"/>
+              </a:ext>
+            </a:extLst>
+          </p:cNvPr>
+          <p:cNvSpPr txBox="1"/>
+          <p:nvPr/>
+        </p:nvSpPr>
+        <p:spPr>
+          <a:xfrm>
+            <a:off x="3788833" y="719667"/>
+            <a:ext cx="7717366" cy="5447645"/>
+          </a:xfrm>
+          <a:prstGeom prst="rect">
+            <a:avLst/>
+          </a:prstGeom>
+          <a:noFill/>
+        </p:spPr>
+        <p:txBody>
+          <a:bodyPr wrap="square">
+            <a:spAutoFit/>
+          </a:bodyPr>
+          <a:lstStyle/>
+          <a:p>
+            <a:pPr marL="342900" indent="-342900">
+              <a:buFont typeface="Arial" panose="020B0604020202020204" pitchFamily="34" charset="0"/>
+              <a:buChar char="•"/>
+            </a:pPr>
+            <a:r>
+              <a:rPr lang="en-US" sz="2400" dirty="0"/>
+              <a:t>USGS (US Geological Survey)</a:t>
+            </a:r>
+          </a:p>
+          <a:p>
+            <a:pPr marL="800100" lvl="1" indent="-342900">
+              <a:buFont typeface="Arial" panose="020B0604020202020204" pitchFamily="34" charset="0"/>
+              <a:buChar char="•"/>
+            </a:pPr>
+            <a:r>
+              <a:rPr lang="en-US" b="0" i="0" u="sng" dirty="0">
+                <a:solidFill>
+                  <a:srgbClr val="1A466C"/>
+                </a:solidFill>
+                <a:effectLst/>
+                <a:hlinkClick r:id="rId3"/>
+              </a:rPr>
+              <a:t>https://maps.waterdata.usgs.gov/mapper/index.html</a:t>
+            </a:r>
+            <a:endParaRPr lang="en-US" b="0" i="0" u="sng" dirty="0">
+              <a:solidFill>
+                <a:srgbClr val="1A466C"/>
+              </a:solidFill>
+              <a:effectLst/>
+            </a:endParaRPr>
+          </a:p>
+          <a:p>
+            <a:pPr marL="800100" lvl="1" indent="-342900">
+              <a:buFont typeface="Arial" panose="020B0604020202020204" pitchFamily="34" charset="0"/>
+              <a:buChar char="•"/>
+            </a:pPr>
+            <a:r>
+              <a:rPr lang="en-US" b="0" i="0" u="sng" dirty="0">
+                <a:solidFill>
+                  <a:srgbClr val="1A466C"/>
+                </a:solidFill>
+                <a:effectLst/>
+                <a:hlinkClick r:id="rId4"/>
+              </a:rPr>
+              <a:t>https://waterdata.usgs.gov/usa/nwis/uv?site_no=453845121562000</a:t>
+            </a:r>
+            <a:endParaRPr lang="en-US" b="0" i="0" u="sng" dirty="0">
+              <a:solidFill>
+                <a:srgbClr val="1A466C"/>
+              </a:solidFill>
+              <a:effectLst/>
+            </a:endParaRPr>
+          </a:p>
+          <a:p>
+            <a:pPr marL="800100" lvl="1" indent="-342900">
+              <a:buFont typeface="Arial" panose="020B0604020202020204" pitchFamily="34" charset="0"/>
+              <a:buChar char="•"/>
+            </a:pPr>
+            <a:r>
+              <a:rPr lang="en-US" b="0" i="0" u="sng" dirty="0">
+                <a:solidFill>
+                  <a:srgbClr val="1A466C"/>
+                </a:solidFill>
+                <a:effectLst/>
+                <a:hlinkClick r:id="rId5"/>
+              </a:rPr>
+              <a:t>https://waterdata.usgs.gov/usa/nwis/uv?site_no=14128600</a:t>
+            </a:r>
+            <a:endParaRPr lang="en-US" b="0" i="0" u="sng" dirty="0">
+              <a:solidFill>
+                <a:srgbClr val="1A466C"/>
+              </a:solidFill>
+              <a:effectLst/>
+            </a:endParaRPr>
+          </a:p>
+          <a:p>
+            <a:pPr marL="800100" lvl="1" indent="-342900">
+              <a:buFont typeface="Arial" panose="020B0604020202020204" pitchFamily="34" charset="0"/>
+              <a:buChar char="•"/>
+            </a:pPr>
+            <a:r>
+              <a:rPr lang="en-US" b="0" i="0" u="sng" dirty="0">
+                <a:solidFill>
+                  <a:srgbClr val="1A466C"/>
+                </a:solidFill>
+                <a:effectLst/>
+                <a:hlinkClick r:id="rId6"/>
+              </a:rPr>
+              <a:t>https://waterdata.usgs.gov/usa/nwis/uv?site_no=14128870</a:t>
+            </a:r>
+            <a:endParaRPr lang="en-US" b="0" i="0" u="sng" dirty="0">
+              <a:solidFill>
+                <a:srgbClr val="1A466C"/>
+              </a:solidFill>
+              <a:effectLst/>
+            </a:endParaRPr>
+          </a:p>
+          <a:p>
+            <a:pPr marL="800100" lvl="1" indent="-342900">
+              <a:buFont typeface="Arial" panose="020B0604020202020204" pitchFamily="34" charset="0"/>
+              <a:buChar char="•"/>
+            </a:pPr>
+            <a:r>
+              <a:rPr lang="en-US" b="0" i="0" u="sng" dirty="0">
+                <a:solidFill>
+                  <a:srgbClr val="296EAA"/>
+                </a:solidFill>
+                <a:effectLst/>
+                <a:hlinkClick r:id="rId7"/>
+              </a:rPr>
+              <a:t>https://waterdata.usgs.gov/usa/nwis/uv?site_no=453630122021400</a:t>
+            </a:r>
+            <a:endParaRPr lang="en-US" u="sng" dirty="0">
+              <a:solidFill>
+                <a:srgbClr val="1A466C"/>
+              </a:solidFill>
+            </a:endParaRPr>
+          </a:p>
+          <a:p>
+            <a:pPr marL="800100" lvl="1" indent="-342900">
+              <a:buFont typeface="Arial" panose="020B0604020202020204" pitchFamily="34" charset="0"/>
+              <a:buChar char="•"/>
+            </a:pPr>
+            <a:r>
+              <a:rPr lang="en-US" u="sng" dirty="0">
+                <a:solidFill>
+                  <a:srgbClr val="296EAA"/>
+                </a:solidFill>
+                <a:hlinkClick r:id="rId8"/>
+              </a:rPr>
+              <a:t>https://waterdata.usgs.gov/usa/nwis/uv?site_no=</a:t>
+            </a:r>
+            <a:r>
+              <a:rPr lang="en-US" b="0" i="0" dirty="0">
+                <a:solidFill>
+                  <a:srgbClr val="000000"/>
+                </a:solidFill>
+                <a:effectLst/>
+                <a:hlinkClick r:id="rId8"/>
+              </a:rPr>
+              <a:t>14211720</a:t>
+            </a:r>
+            <a:endParaRPr lang="en-US" b="0" i="0" dirty="0">
+              <a:solidFill>
+                <a:srgbClr val="000000"/>
+              </a:solidFill>
+              <a:effectLst/>
+            </a:endParaRPr>
+          </a:p>
+          <a:p>
+            <a:pPr marL="800100" lvl="1" indent="-342900">
+              <a:buFont typeface="Arial" panose="020B0604020202020204" pitchFamily="34" charset="0"/>
+              <a:buChar char="•"/>
+            </a:pPr>
+            <a:endParaRPr lang="en-US" sz="2400" dirty="0"/>
+          </a:p>
+          <a:p>
+            <a:pPr marL="342900" indent="-342900">
+              <a:buFont typeface="Arial" panose="020B0604020202020204" pitchFamily="34" charset="0"/>
+              <a:buChar char="•"/>
+            </a:pPr>
+            <a:r>
+              <a:rPr lang="en-US" sz="2400" dirty="0"/>
+              <a:t>NRCS (Natural Resources Conservation Services)</a:t>
+            </a:r>
+          </a:p>
+          <a:p>
+            <a:pPr marL="800100" lvl="1" indent="-342900">
+              <a:buFont typeface="Arial" panose="020B0604020202020204" pitchFamily="34" charset="0"/>
+              <a:buChar char="•"/>
+            </a:pPr>
+            <a:r>
+              <a:rPr lang="en-US" dirty="0">
+                <a:hlinkClick r:id="rId9"/>
+              </a:rPr>
+              <a:t>https://wcc.sc.egov.usda.gov/nwcc/snow-course-sites.jsp?state=OR</a:t>
+            </a:r>
+            <a:endParaRPr lang="en-US" dirty="0"/>
+          </a:p>
+          <a:p>
+            <a:pPr lvl="1"/>
+            <a:endParaRPr lang="en-US" dirty="0"/>
+          </a:p>
+          <a:p>
+            <a:pPr marL="342900" indent="-342900">
+              <a:buFont typeface="Arial" panose="020B0604020202020204" pitchFamily="34" charset="0"/>
+              <a:buChar char="•"/>
+            </a:pPr>
+            <a:r>
+              <a:rPr lang="en-US" sz="2400" dirty="0"/>
+              <a:t>Columbia Basin Research (DART- Data Access in Real Time)</a:t>
+            </a:r>
+          </a:p>
+          <a:p>
+            <a:pPr marL="800100" lvl="1" indent="-342900">
+              <a:buFont typeface="Arial" panose="020B0604020202020204" pitchFamily="34" charset="0"/>
+              <a:buChar char="•"/>
+            </a:pPr>
+            <a:r>
+              <a:rPr lang="en-US" b="0" i="0" u="sng" dirty="0">
+                <a:solidFill>
+                  <a:srgbClr val="296EAA"/>
+                </a:solidFill>
+                <a:effectLst/>
+                <a:hlinkClick r:id="rId10"/>
+              </a:rPr>
+              <a:t>http://www.cbr.washington.edu/dart/query/adult_daily</a:t>
+            </a:r>
+            <a:endParaRPr lang="en-US" dirty="0"/>
+          </a:p>
+          <a:p>
+            <a:pPr marL="342900" indent="-342900">
+              <a:buFont typeface="Arial" panose="020B0604020202020204" pitchFamily="34" charset="0"/>
+              <a:buChar char="•"/>
+            </a:pPr>
+            <a:endParaRPr lang="en-US" sz="2400" dirty="0"/>
+          </a:p>
+          <a:p>
+            <a:pPr marL="342900" indent="-342900">
+              <a:buFont typeface="Arial" panose="020B0604020202020204" pitchFamily="34" charset="0"/>
+              <a:buChar char="•"/>
+            </a:pPr>
+            <a:r>
+              <a:rPr lang="en-US" sz="2400" dirty="0"/>
+              <a:t>US Census</a:t>
+            </a:r>
+          </a:p>
+          <a:p>
+            <a:pPr marL="800100" lvl="1" indent="-342900">
+              <a:buFont typeface="Arial" panose="020B0604020202020204" pitchFamily="34" charset="0"/>
+              <a:buChar char="•"/>
+            </a:pPr>
+            <a:r>
+              <a:rPr lang="en-US" dirty="0">
+                <a:hlinkClick r:id="rId11"/>
+              </a:rPr>
+              <a:t>https://data.census.gov/</a:t>
+            </a:r>
+            <a:endParaRPr lang="en-US" dirty="0"/>
+          </a:p>
+        </p:txBody>
+      </p:sp>
+    </p:spTree>
+    <p:extLst>
+      <p:ext uri="{BB962C8B-B14F-4D97-AF65-F5344CB8AC3E}">
+        <p14:creationId xmlns:p14="http://schemas.microsoft.com/office/powerpoint/2010/main" val="3689763636"/>
+      </p:ext>
+    </p:extLst>
+  </p:cSld>
+  <p:clrMapOvr>
+    <a:masterClrMapping/>
+  </p:clrMapOvr>
+</p:sld>
+</file>
+
 <file path=ppt/slides/slide2.xml><?xml version="1.0" encoding="utf-8"?>
 <p:sld xmlns:a="http://schemas.openxmlformats.org/drawingml/2006/main" xmlns:r="http://schemas.openxmlformats.org/officeDocument/2006/relationships" xmlns:p="http://schemas.openxmlformats.org/presentationml/2006/main">
   <p:cSld>
@@ -6423,7 +7480,7 @@
           </p:nvPr>
         </p:nvPicPr>
         <p:blipFill>
-          <a:blip r:embed="rId2"/>
+          <a:blip r:embed="rId3"/>
           <a:stretch>
             <a:fillRect/>
           </a:stretch>
@@ -7544,7 +8601,7 @@
           <a:lstStyle/>
           <a:p>
             <a:r>
-              <a:rPr lang="en-US" sz="5000" spc="-100"/>
+              <a:rPr lang="en-US" sz="5000" spc="-100" dirty="0"/>
               <a:t>Questions?</a:t>
             </a:r>
           </a:p>

</xml_diff>